<commit_message>
se actualizo el diagrama de conexiones
</commit_message>
<xml_diff>
--- a/ESP32/DIAGRAMA DE CONEXIONES.pptx
+++ b/ESP32/DIAGRAMA DE CONEXIONES.pptx
@@ -104,6 +104,11 @@
       </a:defRPr>
     </a:lvl9pPr>
   </p:defaultTextStyle>
+  <p:extLst>
+    <p:ext uri="{EFAFB233-063F-42B5-8137-9DF3F51BA10A}">
+      <p15:sldGuideLst xmlns:p15="http://schemas.microsoft.com/office/powerpoint/2012/main"/>
+    </p:ext>
+  </p:extLst>
 </p:presentation>
 </file>
 
@@ -256,7 +261,7 @@
           <a:p>
             <a:fld id="{E9041833-5F87-4141-9A69-DFAC4DBD0622}" type="datetimeFigureOut">
               <a:rPr lang="es-AR" smtClean="0"/>
-              <a:t>1/10/2022</a:t>
+              <a:t>4/10/2022</a:t>
             </a:fld>
             <a:endParaRPr lang="es-AR"/>
           </a:p>
@@ -456,7 +461,7 @@
           <a:p>
             <a:fld id="{E9041833-5F87-4141-9A69-DFAC4DBD0622}" type="datetimeFigureOut">
               <a:rPr lang="es-AR" smtClean="0"/>
-              <a:t>1/10/2022</a:t>
+              <a:t>4/10/2022</a:t>
             </a:fld>
             <a:endParaRPr lang="es-AR"/>
           </a:p>
@@ -666,7 +671,7 @@
           <a:p>
             <a:fld id="{E9041833-5F87-4141-9A69-DFAC4DBD0622}" type="datetimeFigureOut">
               <a:rPr lang="es-AR" smtClean="0"/>
-              <a:t>1/10/2022</a:t>
+              <a:t>4/10/2022</a:t>
             </a:fld>
             <a:endParaRPr lang="es-AR"/>
           </a:p>
@@ -866,7 +871,7 @@
           <a:p>
             <a:fld id="{E9041833-5F87-4141-9A69-DFAC4DBD0622}" type="datetimeFigureOut">
               <a:rPr lang="es-AR" smtClean="0"/>
-              <a:t>1/10/2022</a:t>
+              <a:t>4/10/2022</a:t>
             </a:fld>
             <a:endParaRPr lang="es-AR"/>
           </a:p>
@@ -1142,7 +1147,7 @@
           <a:p>
             <a:fld id="{E9041833-5F87-4141-9A69-DFAC4DBD0622}" type="datetimeFigureOut">
               <a:rPr lang="es-AR" smtClean="0"/>
-              <a:t>1/10/2022</a:t>
+              <a:t>4/10/2022</a:t>
             </a:fld>
             <a:endParaRPr lang="es-AR"/>
           </a:p>
@@ -1410,7 +1415,7 @@
           <a:p>
             <a:fld id="{E9041833-5F87-4141-9A69-DFAC4DBD0622}" type="datetimeFigureOut">
               <a:rPr lang="es-AR" smtClean="0"/>
-              <a:t>1/10/2022</a:t>
+              <a:t>4/10/2022</a:t>
             </a:fld>
             <a:endParaRPr lang="es-AR"/>
           </a:p>
@@ -1825,7 +1830,7 @@
           <a:p>
             <a:fld id="{E9041833-5F87-4141-9A69-DFAC4DBD0622}" type="datetimeFigureOut">
               <a:rPr lang="es-AR" smtClean="0"/>
-              <a:t>1/10/2022</a:t>
+              <a:t>4/10/2022</a:t>
             </a:fld>
             <a:endParaRPr lang="es-AR"/>
           </a:p>
@@ -1967,7 +1972,7 @@
           <a:p>
             <a:fld id="{E9041833-5F87-4141-9A69-DFAC4DBD0622}" type="datetimeFigureOut">
               <a:rPr lang="es-AR" smtClean="0"/>
-              <a:t>1/10/2022</a:t>
+              <a:t>4/10/2022</a:t>
             </a:fld>
             <a:endParaRPr lang="es-AR"/>
           </a:p>
@@ -2080,7 +2085,7 @@
           <a:p>
             <a:fld id="{E9041833-5F87-4141-9A69-DFAC4DBD0622}" type="datetimeFigureOut">
               <a:rPr lang="es-AR" smtClean="0"/>
-              <a:t>1/10/2022</a:t>
+              <a:t>4/10/2022</a:t>
             </a:fld>
             <a:endParaRPr lang="es-AR"/>
           </a:p>
@@ -2393,7 +2398,7 @@
           <a:p>
             <a:fld id="{E9041833-5F87-4141-9A69-DFAC4DBD0622}" type="datetimeFigureOut">
               <a:rPr lang="es-AR" smtClean="0"/>
-              <a:t>1/10/2022</a:t>
+              <a:t>4/10/2022</a:t>
             </a:fld>
             <a:endParaRPr lang="es-AR"/>
           </a:p>
@@ -2682,7 +2687,7 @@
           <a:p>
             <a:fld id="{E9041833-5F87-4141-9A69-DFAC4DBD0622}" type="datetimeFigureOut">
               <a:rPr lang="es-AR" smtClean="0"/>
-              <a:t>1/10/2022</a:t>
+              <a:t>4/10/2022</a:t>
             </a:fld>
             <a:endParaRPr lang="es-AR"/>
           </a:p>
@@ -2925,7 +2930,7 @@
           <a:p>
             <a:fld id="{E9041833-5F87-4141-9A69-DFAC4DBD0622}" type="datetimeFigureOut">
               <a:rPr lang="es-AR" smtClean="0"/>
-              <a:t>1/10/2022</a:t>
+              <a:t>4/10/2022</a:t>
             </a:fld>
             <a:endParaRPr lang="es-AR"/>
           </a:p>
@@ -5104,6 +5109,219 @@
             <a:avLst>
               <a:gd name="adj1" fmla="val 72916"/>
             </a:avLst>
+          </a:prstGeom>
+          <a:ln w="38100">
+            <a:solidFill>
+              <a:srgbClr val="FF0000"/>
+            </a:solidFill>
+          </a:ln>
+        </p:spPr>
+        <p:style>
+          <a:lnRef idx="1">
+            <a:schemeClr val="accent1"/>
+          </a:lnRef>
+          <a:fillRef idx="0">
+            <a:schemeClr val="accent1"/>
+          </a:fillRef>
+          <a:effectRef idx="0">
+            <a:schemeClr val="accent1"/>
+          </a:effectRef>
+          <a:fontRef idx="minor">
+            <a:schemeClr val="tx1"/>
+          </a:fontRef>
+        </p:style>
+      </p:cxnSp>
+      <p:cxnSp>
+        <p:nvCxnSpPr>
+          <p:cNvPr id="6" name="Conector recto 5">
+            <a:extLst>
+              <a:ext uri="{FF2B5EF4-FFF2-40B4-BE49-F238E27FC236}">
+                <a16:creationId xmlns:a16="http://schemas.microsoft.com/office/drawing/2014/main" id="{CCF8D571-0A26-4133-B71F-03F149B91489}"/>
+              </a:ext>
+            </a:extLst>
+          </p:cNvPr>
+          <p:cNvCxnSpPr/>
+          <p:nvPr/>
+        </p:nvCxnSpPr>
+        <p:spPr>
+          <a:xfrm>
+            <a:off x="4033911" y="2794985"/>
+            <a:ext cx="198454" cy="0"/>
+          </a:xfrm>
+          <a:prstGeom prst="line">
+            <a:avLst/>
+          </a:prstGeom>
+          <a:ln w="38100">
+            <a:solidFill>
+              <a:schemeClr val="tx1"/>
+            </a:solidFill>
+          </a:ln>
+        </p:spPr>
+        <p:style>
+          <a:lnRef idx="1">
+            <a:schemeClr val="accent1"/>
+          </a:lnRef>
+          <a:fillRef idx="0">
+            <a:schemeClr val="accent1"/>
+          </a:fillRef>
+          <a:effectRef idx="0">
+            <a:schemeClr val="accent1"/>
+          </a:effectRef>
+          <a:fontRef idx="minor">
+            <a:schemeClr val="tx1"/>
+          </a:fontRef>
+        </p:style>
+      </p:cxnSp>
+      <p:cxnSp>
+        <p:nvCxnSpPr>
+          <p:cNvPr id="52" name="Conector recto 51">
+            <a:extLst>
+              <a:ext uri="{FF2B5EF4-FFF2-40B4-BE49-F238E27FC236}">
+                <a16:creationId xmlns:a16="http://schemas.microsoft.com/office/drawing/2014/main" id="{2DE3B381-289A-43A8-8EFB-23C4A5922153}"/>
+              </a:ext>
+            </a:extLst>
+          </p:cNvPr>
+          <p:cNvCxnSpPr>
+            <a:cxnSpLocks/>
+          </p:cNvCxnSpPr>
+          <p:nvPr/>
+        </p:nvCxnSpPr>
+        <p:spPr>
+          <a:xfrm>
+            <a:off x="4033911" y="2794985"/>
+            <a:ext cx="0" cy="1799155"/>
+          </a:xfrm>
+          <a:prstGeom prst="line">
+            <a:avLst/>
+          </a:prstGeom>
+          <a:ln w="38100">
+            <a:solidFill>
+              <a:schemeClr val="tx1"/>
+            </a:solidFill>
+          </a:ln>
+        </p:spPr>
+        <p:style>
+          <a:lnRef idx="1">
+            <a:schemeClr val="accent1"/>
+          </a:lnRef>
+          <a:fillRef idx="0">
+            <a:schemeClr val="accent1"/>
+          </a:fillRef>
+          <a:effectRef idx="0">
+            <a:schemeClr val="accent1"/>
+          </a:effectRef>
+          <a:fontRef idx="minor">
+            <a:schemeClr val="tx1"/>
+          </a:fontRef>
+        </p:style>
+      </p:cxnSp>
+      <p:cxnSp>
+        <p:nvCxnSpPr>
+          <p:cNvPr id="57" name="Conector recto 56">
+            <a:extLst>
+              <a:ext uri="{FF2B5EF4-FFF2-40B4-BE49-F238E27FC236}">
+                <a16:creationId xmlns:a16="http://schemas.microsoft.com/office/drawing/2014/main" id="{57944CEF-4E27-47CD-8A6F-628C113FC38C}"/>
+              </a:ext>
+            </a:extLst>
+          </p:cNvPr>
+          <p:cNvCxnSpPr>
+            <a:cxnSpLocks/>
+          </p:cNvCxnSpPr>
+          <p:nvPr/>
+        </p:nvCxnSpPr>
+        <p:spPr>
+          <a:xfrm>
+            <a:off x="4421442" y="4018539"/>
+            <a:ext cx="4121666" cy="0"/>
+          </a:xfrm>
+          <a:prstGeom prst="line">
+            <a:avLst/>
+          </a:prstGeom>
+          <a:ln w="38100">
+            <a:solidFill>
+              <a:srgbClr val="FF0000"/>
+            </a:solidFill>
+          </a:ln>
+        </p:spPr>
+        <p:style>
+          <a:lnRef idx="1">
+            <a:schemeClr val="accent1"/>
+          </a:lnRef>
+          <a:fillRef idx="0">
+            <a:schemeClr val="accent1"/>
+          </a:fillRef>
+          <a:effectRef idx="0">
+            <a:schemeClr val="accent1"/>
+          </a:effectRef>
+          <a:fontRef idx="minor">
+            <a:schemeClr val="tx1"/>
+          </a:fontRef>
+        </p:style>
+      </p:cxnSp>
+      <p:cxnSp>
+        <p:nvCxnSpPr>
+          <p:cNvPr id="58" name="Conector recto 57">
+            <a:extLst>
+              <a:ext uri="{FF2B5EF4-FFF2-40B4-BE49-F238E27FC236}">
+                <a16:creationId xmlns:a16="http://schemas.microsoft.com/office/drawing/2014/main" id="{29B6FC6E-0936-4642-A7CD-3F7E90AE22BA}"/>
+              </a:ext>
+            </a:extLst>
+          </p:cNvPr>
+          <p:cNvCxnSpPr>
+            <a:cxnSpLocks/>
+          </p:cNvCxnSpPr>
+          <p:nvPr/>
+        </p:nvCxnSpPr>
+        <p:spPr>
+          <a:xfrm>
+            <a:off x="4414577" y="3692098"/>
+            <a:ext cx="0" cy="326441"/>
+          </a:xfrm>
+          <a:prstGeom prst="line">
+            <a:avLst/>
+          </a:prstGeom>
+          <a:ln w="38100">
+            <a:solidFill>
+              <a:srgbClr val="FF0000"/>
+            </a:solidFill>
+          </a:ln>
+        </p:spPr>
+        <p:style>
+          <a:lnRef idx="1">
+            <a:schemeClr val="accent1"/>
+          </a:lnRef>
+          <a:fillRef idx="0">
+            <a:schemeClr val="accent1"/>
+          </a:fillRef>
+          <a:effectRef idx="0">
+            <a:schemeClr val="accent1"/>
+          </a:effectRef>
+          <a:fontRef idx="minor">
+            <a:schemeClr val="tx1"/>
+          </a:fontRef>
+        </p:style>
+      </p:cxnSp>
+      <p:cxnSp>
+        <p:nvCxnSpPr>
+          <p:cNvPr id="59" name="Conector recto 58">
+            <a:extLst>
+              <a:ext uri="{FF2B5EF4-FFF2-40B4-BE49-F238E27FC236}">
+                <a16:creationId xmlns:a16="http://schemas.microsoft.com/office/drawing/2014/main" id="{DCE0E98B-9A67-46AF-9A98-6E5B3068EB24}"/>
+              </a:ext>
+            </a:extLst>
+          </p:cNvPr>
+          <p:cNvCxnSpPr>
+            <a:cxnSpLocks/>
+          </p:cNvCxnSpPr>
+          <p:nvPr/>
+        </p:nvCxnSpPr>
+        <p:spPr>
+          <a:xfrm>
+            <a:off x="8543108" y="157477"/>
+            <a:ext cx="0" cy="3861062"/>
+          </a:xfrm>
+          <a:prstGeom prst="line">
+            <a:avLst/>
           </a:prstGeom>
           <a:ln w="38100">
             <a:solidFill>

</xml_diff>

<commit_message>
CONEXION A BASDE DE DATOS
SE AGREGO LA PRUEBA PARA CONECTAR A UNA BASE DE DATOS FIREBASE Y SE ACTUALIZO EL DIAGREAMA DE  CONEXION
</commit_message>
<xml_diff>
--- a/ESP32/DIAGRAMA DE CONEXIONES.pptx
+++ b/ESP32/DIAGRAMA DE CONEXIONES.pptx
@@ -261,7 +261,7 @@
           <a:p>
             <a:fld id="{E9041833-5F87-4141-9A69-DFAC4DBD0622}" type="datetimeFigureOut">
               <a:rPr lang="es-AR" smtClean="0"/>
-              <a:t>4/10/2022</a:t>
+              <a:t>9/10/2022</a:t>
             </a:fld>
             <a:endParaRPr lang="es-AR"/>
           </a:p>
@@ -461,7 +461,7 @@
           <a:p>
             <a:fld id="{E9041833-5F87-4141-9A69-DFAC4DBD0622}" type="datetimeFigureOut">
               <a:rPr lang="es-AR" smtClean="0"/>
-              <a:t>4/10/2022</a:t>
+              <a:t>9/10/2022</a:t>
             </a:fld>
             <a:endParaRPr lang="es-AR"/>
           </a:p>
@@ -671,7 +671,7 @@
           <a:p>
             <a:fld id="{E9041833-5F87-4141-9A69-DFAC4DBD0622}" type="datetimeFigureOut">
               <a:rPr lang="es-AR" smtClean="0"/>
-              <a:t>4/10/2022</a:t>
+              <a:t>9/10/2022</a:t>
             </a:fld>
             <a:endParaRPr lang="es-AR"/>
           </a:p>
@@ -871,7 +871,7 @@
           <a:p>
             <a:fld id="{E9041833-5F87-4141-9A69-DFAC4DBD0622}" type="datetimeFigureOut">
               <a:rPr lang="es-AR" smtClean="0"/>
-              <a:t>4/10/2022</a:t>
+              <a:t>9/10/2022</a:t>
             </a:fld>
             <a:endParaRPr lang="es-AR"/>
           </a:p>
@@ -1147,7 +1147,7 @@
           <a:p>
             <a:fld id="{E9041833-5F87-4141-9A69-DFAC4DBD0622}" type="datetimeFigureOut">
               <a:rPr lang="es-AR" smtClean="0"/>
-              <a:t>4/10/2022</a:t>
+              <a:t>9/10/2022</a:t>
             </a:fld>
             <a:endParaRPr lang="es-AR"/>
           </a:p>
@@ -1415,7 +1415,7 @@
           <a:p>
             <a:fld id="{E9041833-5F87-4141-9A69-DFAC4DBD0622}" type="datetimeFigureOut">
               <a:rPr lang="es-AR" smtClean="0"/>
-              <a:t>4/10/2022</a:t>
+              <a:t>9/10/2022</a:t>
             </a:fld>
             <a:endParaRPr lang="es-AR"/>
           </a:p>
@@ -1830,7 +1830,7 @@
           <a:p>
             <a:fld id="{E9041833-5F87-4141-9A69-DFAC4DBD0622}" type="datetimeFigureOut">
               <a:rPr lang="es-AR" smtClean="0"/>
-              <a:t>4/10/2022</a:t>
+              <a:t>9/10/2022</a:t>
             </a:fld>
             <a:endParaRPr lang="es-AR"/>
           </a:p>
@@ -1972,7 +1972,7 @@
           <a:p>
             <a:fld id="{E9041833-5F87-4141-9A69-DFAC4DBD0622}" type="datetimeFigureOut">
               <a:rPr lang="es-AR" smtClean="0"/>
-              <a:t>4/10/2022</a:t>
+              <a:t>9/10/2022</a:t>
             </a:fld>
             <a:endParaRPr lang="es-AR"/>
           </a:p>
@@ -2085,7 +2085,7 @@
           <a:p>
             <a:fld id="{E9041833-5F87-4141-9A69-DFAC4DBD0622}" type="datetimeFigureOut">
               <a:rPr lang="es-AR" smtClean="0"/>
-              <a:t>4/10/2022</a:t>
+              <a:t>9/10/2022</a:t>
             </a:fld>
             <a:endParaRPr lang="es-AR"/>
           </a:p>
@@ -2398,7 +2398,7 @@
           <a:p>
             <a:fld id="{E9041833-5F87-4141-9A69-DFAC4DBD0622}" type="datetimeFigureOut">
               <a:rPr lang="es-AR" smtClean="0"/>
-              <a:t>4/10/2022</a:t>
+              <a:t>9/10/2022</a:t>
             </a:fld>
             <a:endParaRPr lang="es-AR"/>
           </a:p>
@@ -2687,7 +2687,7 @@
           <a:p>
             <a:fld id="{E9041833-5F87-4141-9A69-DFAC4DBD0622}" type="datetimeFigureOut">
               <a:rPr lang="es-AR" smtClean="0"/>
-              <a:t>4/10/2022</a:t>
+              <a:t>9/10/2022</a:t>
             </a:fld>
             <a:endParaRPr lang="es-AR"/>
           </a:p>
@@ -2930,7 +2930,7 @@
           <a:p>
             <a:fld id="{E9041833-5F87-4141-9A69-DFAC4DBD0622}" type="datetimeFigureOut">
               <a:rPr lang="es-AR" smtClean="0"/>
-              <a:t>4/10/2022</a:t>
+              <a:t>9/10/2022</a:t>
             </a:fld>
             <a:endParaRPr lang="es-AR"/>
           </a:p>
@@ -4833,7 +4833,7 @@
         <p:spPr>
           <a:xfrm>
             <a:off x="5634395" y="5579"/>
-            <a:ext cx="433132" cy="369332"/>
+            <a:ext cx="560923" cy="369332"/>
           </a:xfrm>
           <a:prstGeom prst="rect">
             <a:avLst/>
@@ -4853,7 +4853,7 @@
           <a:p>
             <a:r>
               <a:rPr lang="es-AR" dirty="0"/>
-              <a:t>5V</a:t>
+              <a:t>VCC</a:t>
             </a:r>
           </a:p>
         </p:txBody>
@@ -4910,17 +4910,18 @@
           </p:cNvPr>
           <p:cNvCxnSpPr>
             <a:cxnSpLocks/>
+            <a:stCxn id="81" idx="3"/>
           </p:cNvCxnSpPr>
           <p:nvPr/>
         </p:nvCxnSpPr>
         <p:spPr>
           <a:xfrm>
-            <a:off x="6097972" y="157477"/>
-            <a:ext cx="3854351" cy="1551027"/>
+            <a:off x="6195318" y="190245"/>
+            <a:ext cx="3635123" cy="1517071"/>
           </a:xfrm>
           <a:prstGeom prst="bentConnector3">
             <a:avLst>
-              <a:gd name="adj1" fmla="val 82351"/>
+              <a:gd name="adj1" fmla="val 85576"/>
             </a:avLst>
           </a:prstGeom>
           <a:ln w="57150">
@@ -5103,11 +5104,11 @@
         <p:spPr>
           <a:xfrm rot="10800000" flipV="1">
             <a:off x="2422175" y="190244"/>
-            <a:ext cx="3212220" cy="2300125"/>
+            <a:ext cx="3212220" cy="2300119"/>
           </a:xfrm>
           <a:prstGeom prst="bentConnector3">
             <a:avLst>
-              <a:gd name="adj1" fmla="val 72916"/>
+              <a:gd name="adj1" fmla="val 50000"/>
             </a:avLst>
           </a:prstGeom>
           <a:ln w="38100">
@@ -5326,6 +5327,234 @@
           <a:ln w="38100">
             <a:solidFill>
               <a:srgbClr val="FF0000"/>
+            </a:solidFill>
+          </a:ln>
+        </p:spPr>
+        <p:style>
+          <a:lnRef idx="1">
+            <a:schemeClr val="accent1"/>
+          </a:lnRef>
+          <a:fillRef idx="0">
+            <a:schemeClr val="accent1"/>
+          </a:fillRef>
+          <a:effectRef idx="0">
+            <a:schemeClr val="accent1"/>
+          </a:effectRef>
+          <a:fontRef idx="minor">
+            <a:schemeClr val="tx1"/>
+          </a:fontRef>
+        </p:style>
+      </p:cxnSp>
+      <p:grpSp>
+        <p:nvGrpSpPr>
+          <p:cNvPr id="3" name="Grupo 2">
+            <a:extLst>
+              <a:ext uri="{FF2B5EF4-FFF2-40B4-BE49-F238E27FC236}">
+                <a16:creationId xmlns:a16="http://schemas.microsoft.com/office/drawing/2014/main" id="{B4AABECC-F591-4107-ABE1-D14566EE6C71}"/>
+              </a:ext>
+            </a:extLst>
+          </p:cNvPr>
+          <p:cNvGrpSpPr/>
+          <p:nvPr/>
+        </p:nvGrpSpPr>
+        <p:grpSpPr>
+          <a:xfrm>
+            <a:off x="11599835" y="763967"/>
+            <a:ext cx="415499" cy="1933393"/>
+            <a:chOff x="11630614" y="1560405"/>
+            <a:chExt cx="415499" cy="1933393"/>
+          </a:xfrm>
+        </p:grpSpPr>
+        <p:sp>
+          <p:nvSpPr>
+            <p:cNvPr id="2" name="CuadroTexto 1">
+              <a:extLst>
+                <a:ext uri="{FF2B5EF4-FFF2-40B4-BE49-F238E27FC236}">
+                  <a16:creationId xmlns:a16="http://schemas.microsoft.com/office/drawing/2014/main" id="{266BE776-FFD0-4FE6-9358-F59452A67369}"/>
+                </a:ext>
+              </a:extLst>
+            </p:cNvPr>
+            <p:cNvSpPr txBox="1"/>
+            <p:nvPr/>
+          </p:nvSpPr>
+          <p:spPr>
+            <a:xfrm rot="16200000">
+              <a:off x="11153604" y="2343016"/>
+              <a:ext cx="1354129" cy="369332"/>
+            </a:xfrm>
+            <a:prstGeom prst="rect">
+              <a:avLst/>
+            </a:prstGeom>
+            <a:noFill/>
+            <a:ln w="28575">
+              <a:solidFill>
+                <a:srgbClr val="7030A0"/>
+              </a:solidFill>
+            </a:ln>
+          </p:spPr>
+          <p:txBody>
+            <a:bodyPr wrap="square" rtlCol="0">
+              <a:spAutoFit/>
+            </a:bodyPr>
+            <a:lstStyle/>
+            <a:p>
+              <a:r>
+                <a:rPr lang="es-AR" dirty="0"/>
+                <a:t> FUENTE 5V</a:t>
+              </a:r>
+            </a:p>
+          </p:txBody>
+        </p:sp>
+        <p:sp>
+          <p:nvSpPr>
+            <p:cNvPr id="61" name="CuadroTexto 60">
+              <a:extLst>
+                <a:ext uri="{FF2B5EF4-FFF2-40B4-BE49-F238E27FC236}">
+                  <a16:creationId xmlns:a16="http://schemas.microsoft.com/office/drawing/2014/main" id="{E4072906-0DB0-41B2-9623-D043861D0B5E}"/>
+                </a:ext>
+              </a:extLst>
+            </p:cNvPr>
+            <p:cNvSpPr txBox="1"/>
+            <p:nvPr/>
+          </p:nvSpPr>
+          <p:spPr>
+            <a:xfrm rot="16200000">
+              <a:off x="11694088" y="1496931"/>
+              <a:ext cx="273162" cy="400110"/>
+            </a:xfrm>
+            <a:prstGeom prst="rect">
+              <a:avLst/>
+            </a:prstGeom>
+            <a:noFill/>
+            <a:ln w="28575">
+              <a:solidFill>
+                <a:srgbClr val="C00000"/>
+              </a:solidFill>
+            </a:ln>
+          </p:spPr>
+          <p:txBody>
+            <a:bodyPr wrap="square" rtlCol="0">
+              <a:spAutoFit/>
+            </a:bodyPr>
+            <a:lstStyle/>
+            <a:p>
+              <a:r>
+                <a:rPr lang="es-AR" sz="2000" dirty="0"/>
+                <a:t>+</a:t>
+              </a:r>
+            </a:p>
+          </p:txBody>
+        </p:sp>
+        <p:sp>
+          <p:nvSpPr>
+            <p:cNvPr id="62" name="CuadroTexto 61">
+              <a:extLst>
+                <a:ext uri="{FF2B5EF4-FFF2-40B4-BE49-F238E27FC236}">
+                  <a16:creationId xmlns:a16="http://schemas.microsoft.com/office/drawing/2014/main" id="{35A52814-BDB0-45B3-8629-2CA15E565776}"/>
+                </a:ext>
+              </a:extLst>
+            </p:cNvPr>
+            <p:cNvSpPr txBox="1"/>
+            <p:nvPr/>
+          </p:nvSpPr>
+          <p:spPr>
+            <a:xfrm rot="16200000">
+              <a:off x="11709477" y="3157163"/>
+              <a:ext cx="273161" cy="400110"/>
+            </a:xfrm>
+            <a:prstGeom prst="rect">
+              <a:avLst/>
+            </a:prstGeom>
+            <a:noFill/>
+            <a:ln w="28575">
+              <a:solidFill>
+                <a:schemeClr val="tx1"/>
+              </a:solidFill>
+            </a:ln>
+          </p:spPr>
+          <p:txBody>
+            <a:bodyPr wrap="square" rtlCol="0">
+              <a:spAutoFit/>
+            </a:bodyPr>
+            <a:lstStyle/>
+            <a:p>
+              <a:r>
+                <a:rPr lang="es-AR" sz="2000" dirty="0"/>
+                <a:t>-</a:t>
+              </a:r>
+            </a:p>
+          </p:txBody>
+        </p:sp>
+      </p:grpSp>
+      <p:cxnSp>
+        <p:nvCxnSpPr>
+          <p:cNvPr id="7" name="Conector: angular 6">
+            <a:extLst>
+              <a:ext uri="{FF2B5EF4-FFF2-40B4-BE49-F238E27FC236}">
+                <a16:creationId xmlns:a16="http://schemas.microsoft.com/office/drawing/2014/main" id="{E4E325BD-1164-4E50-ADFB-3F1608756811}"/>
+              </a:ext>
+            </a:extLst>
+          </p:cNvPr>
+          <p:cNvCxnSpPr>
+            <a:stCxn id="61" idx="3"/>
+          </p:cNvCxnSpPr>
+          <p:nvPr/>
+        </p:nvCxnSpPr>
+        <p:spPr>
+          <a:xfrm rot="16200000" flipV="1">
+            <a:off x="10386576" y="-649347"/>
+            <a:ext cx="320092" cy="2506536"/>
+          </a:xfrm>
+          <a:prstGeom prst="bentConnector2">
+            <a:avLst/>
+          </a:prstGeom>
+          <a:ln w="57150">
+            <a:solidFill>
+              <a:srgbClr val="FF0000"/>
+            </a:solidFill>
+          </a:ln>
+        </p:spPr>
+        <p:style>
+          <a:lnRef idx="1">
+            <a:schemeClr val="accent1"/>
+          </a:lnRef>
+          <a:fillRef idx="0">
+            <a:schemeClr val="accent1"/>
+          </a:fillRef>
+          <a:effectRef idx="0">
+            <a:schemeClr val="accent1"/>
+          </a:effectRef>
+          <a:fontRef idx="minor">
+            <a:schemeClr val="tx1"/>
+          </a:fontRef>
+        </p:style>
+      </p:cxnSp>
+      <p:cxnSp>
+        <p:nvCxnSpPr>
+          <p:cNvPr id="63" name="Conector: angular 62">
+            <a:extLst>
+              <a:ext uri="{FF2B5EF4-FFF2-40B4-BE49-F238E27FC236}">
+                <a16:creationId xmlns:a16="http://schemas.microsoft.com/office/drawing/2014/main" id="{8F4405A9-1F13-4FC2-B236-F5986E574961}"/>
+              </a:ext>
+            </a:extLst>
+          </p:cNvPr>
+          <p:cNvCxnSpPr>
+            <a:cxnSpLocks/>
+            <a:stCxn id="62" idx="1"/>
+          </p:cNvCxnSpPr>
+          <p:nvPr/>
+        </p:nvCxnSpPr>
+        <p:spPr>
+          <a:xfrm rot="5400000">
+            <a:off x="10342242" y="1648474"/>
+            <a:ext cx="424150" cy="2521925"/>
+          </a:xfrm>
+          <a:prstGeom prst="bentConnector2">
+            <a:avLst/>
+          </a:prstGeom>
+          <a:ln w="57150">
+            <a:solidFill>
+              <a:schemeClr val="tx1"/>
             </a:solidFill>
           </a:ln>
         </p:spPr>

</xml_diff>